<commit_message>
upd images and documentations
</commit_message>
<xml_diff>
--- a/Documentation/presentation.pptx
+++ b/Documentation/presentation.pptx
@@ -12,9 +12,16 @@
     <p:sldId id="260" r:id="rId6"/>
     <p:sldId id="261" r:id="rId7"/>
     <p:sldId id="262" r:id="rId8"/>
-    <p:sldId id="263" r:id="rId9"/>
-    <p:sldId id="264" r:id="rId10"/>
-    <p:sldId id="265" r:id="rId11"/>
+    <p:sldId id="266" r:id="rId9"/>
+    <p:sldId id="267" r:id="rId10"/>
+    <p:sldId id="268" r:id="rId11"/>
+    <p:sldId id="269" r:id="rId12"/>
+    <p:sldId id="263" r:id="rId13"/>
+    <p:sldId id="272" r:id="rId14"/>
+    <p:sldId id="264" r:id="rId15"/>
+    <p:sldId id="265" r:id="rId16"/>
+    <p:sldId id="270" r:id="rId17"/>
+    <p:sldId id="271" r:id="rId18"/>
   </p:sldIdLst>
   <p:sldSz cx="12192000" cy="6858000"/>
   <p:notesSz cx="6858000" cy="9144000"/>
@@ -113,6 +120,11 @@
       </a:defRPr>
     </a:lvl9pPr>
   </p:defaultTextStyle>
+  <p:extLst>
+    <p:ext uri="{EFAFB233-063F-42B5-8137-9DF3F51BA10A}">
+      <p15:sldGuideLst xmlns:p15="http://schemas.microsoft.com/office/powerpoint/2012/main"/>
+    </p:ext>
+  </p:extLst>
 </p:presentation>
 </file>
 
@@ -1526,7 +1538,7 @@
             <a:fld id="{48A87A34-81AB-432B-8DAE-1953F412C126}" type="datetimeFigureOut">
               <a:rPr lang="en-US" dirty="0"/>
               <a:pPr/>
-              <a:t>1/4/21</a:t>
+              <a:t>1/7/21</a:t>
             </a:fld>
             <a:endParaRPr lang="en-US" dirty="0"/>
           </a:p>
@@ -2980,7 +2992,7 @@
           <a:p>
             <a:fld id="{48A87A34-81AB-432B-8DAE-1953F412C126}" type="datetimeFigureOut">
               <a:rPr lang="en-US" dirty="0"/>
-              <a:t>1/4/21</a:t>
+              <a:t>1/7/21</a:t>
             </a:fld>
             <a:endParaRPr lang="en-US" dirty="0"/>
           </a:p>
@@ -4428,7 +4440,7 @@
           <a:p>
             <a:fld id="{48A87A34-81AB-432B-8DAE-1953F412C126}" type="datetimeFigureOut">
               <a:rPr lang="en-US" dirty="0"/>
-              <a:t>1/4/21</a:t>
+              <a:t>1/7/21</a:t>
             </a:fld>
             <a:endParaRPr lang="en-US" dirty="0"/>
           </a:p>
@@ -5878,7 +5890,7 @@
           <a:p>
             <a:fld id="{48A87A34-81AB-432B-8DAE-1953F412C126}" type="datetimeFigureOut">
               <a:rPr lang="en-US" dirty="0"/>
-              <a:t>1/4/21</a:t>
+              <a:t>1/7/21</a:t>
             </a:fld>
             <a:endParaRPr lang="en-US" dirty="0"/>
           </a:p>
@@ -7381,7 +7393,7 @@
           <a:p>
             <a:fld id="{48A87A34-81AB-432B-8DAE-1953F412C126}" type="datetimeFigureOut">
               <a:rPr lang="en-US" dirty="0"/>
-              <a:t>1/4/21</a:t>
+              <a:t>1/7/21</a:t>
             </a:fld>
             <a:endParaRPr lang="en-US" dirty="0"/>
           </a:p>
@@ -8897,7 +8909,7 @@
           <a:p>
             <a:fld id="{48A87A34-81AB-432B-8DAE-1953F412C126}" type="datetimeFigureOut">
               <a:rPr lang="en-US" dirty="0"/>
-              <a:t>1/4/21</a:t>
+              <a:t>1/7/21</a:t>
             </a:fld>
             <a:endParaRPr lang="en-US" dirty="0"/>
           </a:p>
@@ -10557,7 +10569,7 @@
           <a:p>
             <a:fld id="{48A87A34-81AB-432B-8DAE-1953F412C126}" type="datetimeFigureOut">
               <a:rPr lang="en-US" dirty="0"/>
-              <a:t>1/4/21</a:t>
+              <a:t>1/7/21</a:t>
             </a:fld>
             <a:endParaRPr lang="en-US" dirty="0"/>
           </a:p>
@@ -11950,7 +11962,7 @@
           <a:p>
             <a:fld id="{48A87A34-81AB-432B-8DAE-1953F412C126}" type="datetimeFigureOut">
               <a:rPr lang="en-US" dirty="0"/>
-              <a:t>1/4/21</a:t>
+              <a:t>1/7/21</a:t>
             </a:fld>
             <a:endParaRPr lang="en-US" dirty="0"/>
           </a:p>
@@ -12045,7 +12057,7 @@
           <a:p>
             <a:fld id="{48A87A34-81AB-432B-8DAE-1953F412C126}" type="datetimeFigureOut">
               <a:rPr lang="en-US" dirty="0"/>
-              <a:t>1/4/21</a:t>
+              <a:t>1/7/21</a:t>
             </a:fld>
             <a:endParaRPr lang="en-US" dirty="0"/>
           </a:p>
@@ -13566,7 +13578,7 @@
           <a:p>
             <a:fld id="{48A87A34-81AB-432B-8DAE-1953F412C126}" type="datetimeFigureOut">
               <a:rPr lang="en-US" dirty="0"/>
-              <a:t>1/4/21</a:t>
+              <a:t>1/7/21</a:t>
             </a:fld>
             <a:endParaRPr lang="en-US" dirty="0"/>
           </a:p>
@@ -15097,7 +15109,7 @@
           <a:p>
             <a:fld id="{48A87A34-81AB-432B-8DAE-1953F412C126}" type="datetimeFigureOut">
               <a:rPr lang="en-US" dirty="0"/>
-              <a:t>1/4/21</a:t>
+              <a:t>1/7/21</a:t>
             </a:fld>
             <a:endParaRPr lang="en-US" dirty="0"/>
           </a:p>
@@ -15316,7 +15328,7 @@
             <a:fld id="{48A87A34-81AB-432B-8DAE-1953F412C126}" type="datetimeFigureOut">
               <a:rPr lang="en-US" dirty="0"/>
               <a:pPr/>
-              <a:t>1/4/21</a:t>
+              <a:t>1/7/21</a:t>
             </a:fld>
             <a:endParaRPr lang="en-US" dirty="0"/>
           </a:p>
@@ -15862,6 +15874,585 @@
           <p:cNvPr id="2" name="Заголовок 1">
             <a:extLst>
               <a:ext uri="{FF2B5EF4-FFF2-40B4-BE49-F238E27FC236}">
+                <a16:creationId xmlns:a16="http://schemas.microsoft.com/office/drawing/2014/main" id="{D3E106DE-6637-D149-9A57-556712591AC0}"/>
+              </a:ext>
+            </a:extLst>
+          </p:cNvPr>
+          <p:cNvSpPr>
+            <a:spLocks noGrp="1"/>
+          </p:cNvSpPr>
+          <p:nvPr>
+            <p:ph type="title"/>
+          </p:nvPr>
+        </p:nvSpPr>
+        <p:spPr/>
+        <p:txBody>
+          <a:bodyPr/>
+          <a:lstStyle/>
+          <a:p>
+            <a:r>
+              <a:rPr lang="ru-RU" dirty="0"/>
+              <a:t>Стартовый экран</a:t>
+            </a:r>
+          </a:p>
+        </p:txBody>
+      </p:sp>
+      <p:sp>
+        <p:nvSpPr>
+          <p:cNvPr id="3" name="Объект 2">
+            <a:extLst>
+              <a:ext uri="{FF2B5EF4-FFF2-40B4-BE49-F238E27FC236}">
+                <a16:creationId xmlns:a16="http://schemas.microsoft.com/office/drawing/2014/main" id="{0501DC2A-F4CA-C649-8C07-AC6F398C0D3E}"/>
+              </a:ext>
+            </a:extLst>
+          </p:cNvPr>
+          <p:cNvSpPr>
+            <a:spLocks noGrp="1"/>
+          </p:cNvSpPr>
+          <p:nvPr>
+            <p:ph idx="1"/>
+          </p:nvPr>
+        </p:nvSpPr>
+        <p:spPr/>
+        <p:txBody>
+          <a:bodyPr>
+            <a:normAutofit/>
+          </a:bodyPr>
+          <a:lstStyle/>
+          <a:p>
+            <a:pPr marL="0" lvl="0" indent="0">
+              <a:buNone/>
+            </a:pPr>
+            <a:endParaRPr lang="ru-RU" sz="2800" dirty="0"/>
+          </a:p>
+        </p:txBody>
+      </p:sp>
+      <p:pic>
+        <p:nvPicPr>
+          <p:cNvPr id="6" name="Рисунок 5">
+            <a:extLst>
+              <a:ext uri="{FF2B5EF4-FFF2-40B4-BE49-F238E27FC236}">
+                <a16:creationId xmlns:a16="http://schemas.microsoft.com/office/drawing/2014/main" id="{BBED14F7-9FAD-7144-8C3A-BCDC047DAD10}"/>
+              </a:ext>
+            </a:extLst>
+          </p:cNvPr>
+          <p:cNvPicPr>
+            <a:picLocks noChangeAspect="1"/>
+          </p:cNvPicPr>
+          <p:nvPr/>
+        </p:nvPicPr>
+        <p:blipFill>
+          <a:blip r:embed="rId2"/>
+          <a:stretch>
+            <a:fillRect/>
+          </a:stretch>
+        </p:blipFill>
+        <p:spPr>
+          <a:xfrm>
+            <a:off x="5142201" y="803186"/>
+            <a:ext cx="6258119" cy="5245310"/>
+          </a:xfrm>
+          <a:prstGeom prst="rect">
+            <a:avLst/>
+          </a:prstGeom>
+        </p:spPr>
+      </p:pic>
+    </p:spTree>
+    <p:extLst>
+      <p:ext uri="{BB962C8B-B14F-4D97-AF65-F5344CB8AC3E}">
+        <p14:creationId xmlns:p14="http://schemas.microsoft.com/office/powerpoint/2010/main" val="3833275417"/>
+      </p:ext>
+    </p:extLst>
+  </p:cSld>
+  <p:clrMapOvr>
+    <a:masterClrMapping/>
+  </p:clrMapOvr>
+</p:sld>
+</file>
+
+<file path=ppt/slides/slide11.xml><?xml version="1.0" encoding="utf-8"?>
+<p:sld xmlns:a="http://schemas.openxmlformats.org/drawingml/2006/main" xmlns:r="http://schemas.openxmlformats.org/officeDocument/2006/relationships" xmlns:p="http://schemas.openxmlformats.org/presentationml/2006/main">
+  <p:cSld>
+    <p:spTree>
+      <p:nvGrpSpPr>
+        <p:cNvPr id="1" name=""/>
+        <p:cNvGrpSpPr/>
+        <p:nvPr/>
+      </p:nvGrpSpPr>
+      <p:grpSpPr>
+        <a:xfrm>
+          <a:off x="0" y="0"/>
+          <a:ext cx="0" cy="0"/>
+          <a:chOff x="0" y="0"/>
+          <a:chExt cx="0" cy="0"/>
+        </a:xfrm>
+      </p:grpSpPr>
+      <p:sp>
+        <p:nvSpPr>
+          <p:cNvPr id="2" name="Заголовок 1">
+            <a:extLst>
+              <a:ext uri="{FF2B5EF4-FFF2-40B4-BE49-F238E27FC236}">
+                <a16:creationId xmlns:a16="http://schemas.microsoft.com/office/drawing/2014/main" id="{D3E106DE-6637-D149-9A57-556712591AC0}"/>
+              </a:ext>
+            </a:extLst>
+          </p:cNvPr>
+          <p:cNvSpPr>
+            <a:spLocks noGrp="1"/>
+          </p:cNvSpPr>
+          <p:nvPr>
+            <p:ph type="title"/>
+          </p:nvPr>
+        </p:nvSpPr>
+        <p:spPr/>
+        <p:txBody>
+          <a:bodyPr/>
+          <a:lstStyle/>
+          <a:p>
+            <a:r>
+              <a:rPr lang="ru-RU" dirty="0"/>
+              <a:t>Таблица рекордов</a:t>
+            </a:r>
+          </a:p>
+        </p:txBody>
+      </p:sp>
+      <p:sp>
+        <p:nvSpPr>
+          <p:cNvPr id="3" name="Объект 2">
+            <a:extLst>
+              <a:ext uri="{FF2B5EF4-FFF2-40B4-BE49-F238E27FC236}">
+                <a16:creationId xmlns:a16="http://schemas.microsoft.com/office/drawing/2014/main" id="{0501DC2A-F4CA-C649-8C07-AC6F398C0D3E}"/>
+              </a:ext>
+            </a:extLst>
+          </p:cNvPr>
+          <p:cNvSpPr>
+            <a:spLocks noGrp="1"/>
+          </p:cNvSpPr>
+          <p:nvPr>
+            <p:ph idx="1"/>
+          </p:nvPr>
+        </p:nvSpPr>
+        <p:spPr/>
+        <p:txBody>
+          <a:bodyPr>
+            <a:normAutofit/>
+          </a:bodyPr>
+          <a:lstStyle/>
+          <a:p>
+            <a:pPr marL="0" lvl="0" indent="0">
+              <a:buNone/>
+            </a:pPr>
+            <a:endParaRPr lang="ru-RU" sz="2800" dirty="0"/>
+          </a:p>
+        </p:txBody>
+      </p:sp>
+      <p:pic>
+        <p:nvPicPr>
+          <p:cNvPr id="6" name="Рисунок 5">
+            <a:extLst>
+              <a:ext uri="{FF2B5EF4-FFF2-40B4-BE49-F238E27FC236}">
+                <a16:creationId xmlns:a16="http://schemas.microsoft.com/office/drawing/2014/main" id="{BBED14F7-9FAD-7144-8C3A-BCDC047DAD10}"/>
+              </a:ext>
+            </a:extLst>
+          </p:cNvPr>
+          <p:cNvPicPr>
+            <a:picLocks noChangeAspect="1"/>
+          </p:cNvPicPr>
+          <p:nvPr/>
+        </p:nvPicPr>
+        <p:blipFill>
+          <a:blip r:embed="rId2"/>
+          <a:srcRect/>
+          <a:stretch/>
+        </p:blipFill>
+        <p:spPr>
+          <a:xfrm>
+            <a:off x="5118447" y="803186"/>
+            <a:ext cx="6281873" cy="5245310"/>
+          </a:xfrm>
+          <a:prstGeom prst="rect">
+            <a:avLst/>
+          </a:prstGeom>
+        </p:spPr>
+      </p:pic>
+    </p:spTree>
+    <p:extLst>
+      <p:ext uri="{BB962C8B-B14F-4D97-AF65-F5344CB8AC3E}">
+        <p14:creationId xmlns:p14="http://schemas.microsoft.com/office/powerpoint/2010/main" val="418324001"/>
+      </p:ext>
+    </p:extLst>
+  </p:cSld>
+  <p:clrMapOvr>
+    <a:masterClrMapping/>
+  </p:clrMapOvr>
+</p:sld>
+</file>
+
+<file path=ppt/slides/slide12.xml><?xml version="1.0" encoding="utf-8"?>
+<p:sld xmlns:a="http://schemas.openxmlformats.org/drawingml/2006/main" xmlns:r="http://schemas.openxmlformats.org/officeDocument/2006/relationships" xmlns:p="http://schemas.openxmlformats.org/presentationml/2006/main">
+  <p:cSld>
+    <p:spTree>
+      <p:nvGrpSpPr>
+        <p:cNvPr id="1" name=""/>
+        <p:cNvGrpSpPr/>
+        <p:nvPr/>
+      </p:nvGrpSpPr>
+      <p:grpSpPr>
+        <a:xfrm>
+          <a:off x="0" y="0"/>
+          <a:ext cx="0" cy="0"/>
+          <a:chOff x="0" y="0"/>
+          <a:chExt cx="0" cy="0"/>
+        </a:xfrm>
+      </p:grpSpPr>
+      <p:sp>
+        <p:nvSpPr>
+          <p:cNvPr id="2" name="Заголовок 1">
+            <a:extLst>
+              <a:ext uri="{FF2B5EF4-FFF2-40B4-BE49-F238E27FC236}">
+                <a16:creationId xmlns:a16="http://schemas.microsoft.com/office/drawing/2014/main" id="{03B6056E-DCCA-4247-9274-474F85E55243}"/>
+              </a:ext>
+            </a:extLst>
+          </p:cNvPr>
+          <p:cNvSpPr>
+            <a:spLocks noGrp="1"/>
+          </p:cNvSpPr>
+          <p:nvPr>
+            <p:ph type="title"/>
+          </p:nvPr>
+        </p:nvSpPr>
+        <p:spPr/>
+        <p:txBody>
+          <a:bodyPr/>
+          <a:lstStyle/>
+          <a:p>
+            <a:r>
+              <a:rPr lang="ru-RU" dirty="0"/>
+              <a:t>Нулевой уровень</a:t>
+            </a:r>
+          </a:p>
+        </p:txBody>
+      </p:sp>
+      <p:pic>
+        <p:nvPicPr>
+          <p:cNvPr id="6" name="Объект 5">
+            <a:extLst>
+              <a:ext uri="{FF2B5EF4-FFF2-40B4-BE49-F238E27FC236}">
+                <a16:creationId xmlns:a16="http://schemas.microsoft.com/office/drawing/2014/main" id="{224E80C8-BC3A-FC48-AE2F-29F6D878D807}"/>
+              </a:ext>
+            </a:extLst>
+          </p:cNvPr>
+          <p:cNvPicPr>
+            <a:picLocks noGrp="1" noChangeAspect="1"/>
+          </p:cNvPicPr>
+          <p:nvPr>
+            <p:ph idx="1"/>
+          </p:nvPr>
+        </p:nvPicPr>
+        <p:blipFill>
+          <a:blip r:embed="rId2"/>
+          <a:stretch>
+            <a:fillRect/>
+          </a:stretch>
+        </p:blipFill>
+        <p:spPr>
+          <a:xfrm>
+            <a:off x="5476816" y="803275"/>
+            <a:ext cx="5542081" cy="5249863"/>
+          </a:xfrm>
+        </p:spPr>
+      </p:pic>
+      <p:sp>
+        <p:nvSpPr>
+          <p:cNvPr id="4" name="Текст 3">
+            <a:extLst>
+              <a:ext uri="{FF2B5EF4-FFF2-40B4-BE49-F238E27FC236}">
+                <a16:creationId xmlns:a16="http://schemas.microsoft.com/office/drawing/2014/main" id="{47F4570A-8A82-8744-8A68-C4DF26222256}"/>
+              </a:ext>
+            </a:extLst>
+          </p:cNvPr>
+          <p:cNvSpPr>
+            <a:spLocks noGrp="1"/>
+          </p:cNvSpPr>
+          <p:nvPr>
+            <p:ph type="body" sz="half" idx="2"/>
+          </p:nvPr>
+        </p:nvSpPr>
+        <p:spPr/>
+        <p:txBody>
+          <a:bodyPr/>
+          <a:lstStyle/>
+          <a:p>
+            <a:r>
+              <a:rPr lang="ru-RU" dirty="0"/>
+              <a:t>Цвет коробочек – серый, у игрока максимум жизней, скорость падения - минимальна</a:t>
+            </a:r>
+          </a:p>
+        </p:txBody>
+      </p:sp>
+    </p:spTree>
+    <p:extLst>
+      <p:ext uri="{BB962C8B-B14F-4D97-AF65-F5344CB8AC3E}">
+        <p14:creationId xmlns:p14="http://schemas.microsoft.com/office/powerpoint/2010/main" val="3884946651"/>
+      </p:ext>
+    </p:extLst>
+  </p:cSld>
+  <p:clrMapOvr>
+    <a:masterClrMapping/>
+  </p:clrMapOvr>
+</p:sld>
+</file>
+
+<file path=ppt/slides/slide13.xml><?xml version="1.0" encoding="utf-8"?>
+<p:sld xmlns:a="http://schemas.openxmlformats.org/drawingml/2006/main" xmlns:r="http://schemas.openxmlformats.org/officeDocument/2006/relationships" xmlns:p="http://schemas.openxmlformats.org/presentationml/2006/main">
+  <p:cSld>
+    <p:spTree>
+      <p:nvGrpSpPr>
+        <p:cNvPr id="1" name=""/>
+        <p:cNvGrpSpPr/>
+        <p:nvPr/>
+      </p:nvGrpSpPr>
+      <p:grpSpPr>
+        <a:xfrm>
+          <a:off x="0" y="0"/>
+          <a:ext cx="0" cy="0"/>
+          <a:chOff x="0" y="0"/>
+          <a:chExt cx="0" cy="0"/>
+        </a:xfrm>
+      </p:grpSpPr>
+      <p:sp>
+        <p:nvSpPr>
+          <p:cNvPr id="2" name="Заголовок 1">
+            <a:extLst>
+              <a:ext uri="{FF2B5EF4-FFF2-40B4-BE49-F238E27FC236}">
+                <a16:creationId xmlns:a16="http://schemas.microsoft.com/office/drawing/2014/main" id="{03B6056E-DCCA-4247-9274-474F85E55243}"/>
+              </a:ext>
+            </a:extLst>
+          </p:cNvPr>
+          <p:cNvSpPr>
+            <a:spLocks noGrp="1"/>
+          </p:cNvSpPr>
+          <p:nvPr>
+            <p:ph type="title"/>
+          </p:nvPr>
+        </p:nvSpPr>
+        <p:spPr/>
+        <p:txBody>
+          <a:bodyPr/>
+          <a:lstStyle/>
+          <a:p>
+            <a:r>
+              <a:rPr lang="ru-RU" dirty="0"/>
+              <a:t>Меню паузы</a:t>
+            </a:r>
+          </a:p>
+        </p:txBody>
+      </p:sp>
+      <p:pic>
+        <p:nvPicPr>
+          <p:cNvPr id="6" name="Объект 5">
+            <a:extLst>
+              <a:ext uri="{FF2B5EF4-FFF2-40B4-BE49-F238E27FC236}">
+                <a16:creationId xmlns:a16="http://schemas.microsoft.com/office/drawing/2014/main" id="{224E80C8-BC3A-FC48-AE2F-29F6D878D807}"/>
+              </a:ext>
+            </a:extLst>
+          </p:cNvPr>
+          <p:cNvPicPr>
+            <a:picLocks noGrp="1" noChangeAspect="1"/>
+          </p:cNvPicPr>
+          <p:nvPr>
+            <p:ph idx="1"/>
+          </p:nvPr>
+        </p:nvPicPr>
+        <p:blipFill>
+          <a:blip r:embed="rId2"/>
+          <a:srcRect/>
+          <a:stretch/>
+        </p:blipFill>
+        <p:spPr>
+          <a:xfrm>
+            <a:off x="5477095" y="803275"/>
+            <a:ext cx="5541522" cy="5249863"/>
+          </a:xfrm>
+        </p:spPr>
+      </p:pic>
+      <p:sp>
+        <p:nvSpPr>
+          <p:cNvPr id="4" name="Текст 3">
+            <a:extLst>
+              <a:ext uri="{FF2B5EF4-FFF2-40B4-BE49-F238E27FC236}">
+                <a16:creationId xmlns:a16="http://schemas.microsoft.com/office/drawing/2014/main" id="{47F4570A-8A82-8744-8A68-C4DF26222256}"/>
+              </a:ext>
+            </a:extLst>
+          </p:cNvPr>
+          <p:cNvSpPr>
+            <a:spLocks noGrp="1"/>
+          </p:cNvSpPr>
+          <p:nvPr>
+            <p:ph type="body" sz="half" idx="2"/>
+          </p:nvPr>
+        </p:nvSpPr>
+        <p:spPr/>
+        <p:txBody>
+          <a:bodyPr/>
+          <a:lstStyle/>
+          <a:p>
+            <a:r>
+              <a:rPr lang="ru-RU" dirty="0"/>
+              <a:t>Есть возможность перезапустить игру, вернуться к текущему состоянию или выйти</a:t>
+            </a:r>
+          </a:p>
+        </p:txBody>
+      </p:sp>
+    </p:spTree>
+    <p:extLst>
+      <p:ext uri="{BB962C8B-B14F-4D97-AF65-F5344CB8AC3E}">
+        <p14:creationId xmlns:p14="http://schemas.microsoft.com/office/powerpoint/2010/main" val="1519016154"/>
+      </p:ext>
+    </p:extLst>
+  </p:cSld>
+  <p:clrMapOvr>
+    <a:masterClrMapping/>
+  </p:clrMapOvr>
+</p:sld>
+</file>
+
+<file path=ppt/slides/slide14.xml><?xml version="1.0" encoding="utf-8"?>
+<p:sld xmlns:a="http://schemas.openxmlformats.org/drawingml/2006/main" xmlns:r="http://schemas.openxmlformats.org/officeDocument/2006/relationships" xmlns:p="http://schemas.openxmlformats.org/presentationml/2006/main">
+  <p:cSld>
+    <p:spTree>
+      <p:nvGrpSpPr>
+        <p:cNvPr id="1" name=""/>
+        <p:cNvGrpSpPr/>
+        <p:nvPr/>
+      </p:nvGrpSpPr>
+      <p:grpSpPr>
+        <a:xfrm>
+          <a:off x="0" y="0"/>
+          <a:ext cx="0" cy="0"/>
+          <a:chOff x="0" y="0"/>
+          <a:chExt cx="0" cy="0"/>
+        </a:xfrm>
+      </p:grpSpPr>
+      <p:sp>
+        <p:nvSpPr>
+          <p:cNvPr id="2" name="Заголовок 1">
+            <a:extLst>
+              <a:ext uri="{FF2B5EF4-FFF2-40B4-BE49-F238E27FC236}">
+                <a16:creationId xmlns:a16="http://schemas.microsoft.com/office/drawing/2014/main" id="{421A76EF-F1F0-214D-A6DF-C00448B82CE1}"/>
+              </a:ext>
+            </a:extLst>
+          </p:cNvPr>
+          <p:cNvSpPr>
+            <a:spLocks noGrp="1"/>
+          </p:cNvSpPr>
+          <p:nvPr>
+            <p:ph type="title"/>
+          </p:nvPr>
+        </p:nvSpPr>
+        <p:spPr/>
+        <p:txBody>
+          <a:bodyPr/>
+          <a:lstStyle/>
+          <a:p>
+            <a:r>
+              <a:rPr lang="ru-RU" dirty="0"/>
+              <a:t>Первый уровень</a:t>
+            </a:r>
+          </a:p>
+        </p:txBody>
+      </p:sp>
+      <p:pic>
+        <p:nvPicPr>
+          <p:cNvPr id="6" name="Объект 5">
+            <a:extLst>
+              <a:ext uri="{FF2B5EF4-FFF2-40B4-BE49-F238E27FC236}">
+                <a16:creationId xmlns:a16="http://schemas.microsoft.com/office/drawing/2014/main" id="{1AE9ECA7-0E7C-CF41-A509-763D301775BD}"/>
+              </a:ext>
+            </a:extLst>
+          </p:cNvPr>
+          <p:cNvPicPr>
+            <a:picLocks noGrp="1" noChangeAspect="1"/>
+          </p:cNvPicPr>
+          <p:nvPr>
+            <p:ph idx="1"/>
+          </p:nvPr>
+        </p:nvPicPr>
+        <p:blipFill>
+          <a:blip r:embed="rId2"/>
+          <a:stretch>
+            <a:fillRect/>
+          </a:stretch>
+        </p:blipFill>
+        <p:spPr>
+          <a:xfrm>
+            <a:off x="5455051" y="803275"/>
+            <a:ext cx="5585610" cy="5249863"/>
+          </a:xfrm>
+        </p:spPr>
+      </p:pic>
+      <p:sp>
+        <p:nvSpPr>
+          <p:cNvPr id="4" name="Текст 3">
+            <a:extLst>
+              <a:ext uri="{FF2B5EF4-FFF2-40B4-BE49-F238E27FC236}">
+                <a16:creationId xmlns:a16="http://schemas.microsoft.com/office/drawing/2014/main" id="{9AC3A3C3-CB7E-1D48-9291-FB76FDE5A3B6}"/>
+              </a:ext>
+            </a:extLst>
+          </p:cNvPr>
+          <p:cNvSpPr>
+            <a:spLocks noGrp="1"/>
+          </p:cNvSpPr>
+          <p:nvPr>
+            <p:ph type="body" sz="half" idx="2"/>
+          </p:nvPr>
+        </p:nvSpPr>
+        <p:spPr/>
+        <p:txBody>
+          <a:bodyPr/>
+          <a:lstStyle/>
+          <a:p>
+            <a:r>
+              <a:rPr lang="ru-RU" dirty="0"/>
+              <a:t>Цвет коробочек сменился, в том числе у падающих.</a:t>
+            </a:r>
+          </a:p>
+        </p:txBody>
+      </p:sp>
+    </p:spTree>
+    <p:extLst>
+      <p:ext uri="{BB962C8B-B14F-4D97-AF65-F5344CB8AC3E}">
+        <p14:creationId xmlns:p14="http://schemas.microsoft.com/office/powerpoint/2010/main" val="3444588590"/>
+      </p:ext>
+    </p:extLst>
+  </p:cSld>
+  <p:clrMapOvr>
+    <a:masterClrMapping/>
+  </p:clrMapOvr>
+</p:sld>
+</file>
+
+<file path=ppt/slides/slide15.xml><?xml version="1.0" encoding="utf-8"?>
+<p:sld xmlns:a="http://schemas.openxmlformats.org/drawingml/2006/main" xmlns:r="http://schemas.openxmlformats.org/officeDocument/2006/relationships" xmlns:p="http://schemas.openxmlformats.org/presentationml/2006/main">
+  <p:cSld>
+    <p:spTree>
+      <p:nvGrpSpPr>
+        <p:cNvPr id="1" name=""/>
+        <p:cNvGrpSpPr/>
+        <p:nvPr/>
+      </p:nvGrpSpPr>
+      <p:grpSpPr>
+        <a:xfrm>
+          <a:off x="0" y="0"/>
+          <a:ext cx="0" cy="0"/>
+          <a:chOff x="0" y="0"/>
+          <a:chExt cx="0" cy="0"/>
+        </a:xfrm>
+      </p:grpSpPr>
+      <p:sp>
+        <p:nvSpPr>
+          <p:cNvPr id="2" name="Заголовок 1">
+            <a:extLst>
+              <a:ext uri="{FF2B5EF4-FFF2-40B4-BE49-F238E27FC236}">
                 <a16:creationId xmlns:a16="http://schemas.microsoft.com/office/drawing/2014/main" id="{868B3D23-1C44-A448-BB03-E2BC0BD36F57}"/>
               </a:ext>
             </a:extLst>
@@ -15946,6 +16537,234 @@
     <p:extLst>
       <p:ext uri="{BB962C8B-B14F-4D97-AF65-F5344CB8AC3E}">
         <p14:creationId xmlns:p14="http://schemas.microsoft.com/office/powerpoint/2010/main" val="2704272247"/>
+      </p:ext>
+    </p:extLst>
+  </p:cSld>
+  <p:clrMapOvr>
+    <a:masterClrMapping/>
+  </p:clrMapOvr>
+</p:sld>
+</file>
+
+<file path=ppt/slides/slide16.xml><?xml version="1.0" encoding="utf-8"?>
+<p:sld xmlns:a="http://schemas.openxmlformats.org/drawingml/2006/main" xmlns:r="http://schemas.openxmlformats.org/officeDocument/2006/relationships" xmlns:p="http://schemas.openxmlformats.org/presentationml/2006/main">
+  <p:cSld>
+    <p:spTree>
+      <p:nvGrpSpPr>
+        <p:cNvPr id="1" name=""/>
+        <p:cNvGrpSpPr/>
+        <p:nvPr/>
+      </p:nvGrpSpPr>
+      <p:grpSpPr>
+        <a:xfrm>
+          <a:off x="0" y="0"/>
+          <a:ext cx="0" cy="0"/>
+          <a:chOff x="0" y="0"/>
+          <a:chExt cx="0" cy="0"/>
+        </a:xfrm>
+      </p:grpSpPr>
+      <p:sp>
+        <p:nvSpPr>
+          <p:cNvPr id="2" name="Заголовок 1">
+            <a:extLst>
+              <a:ext uri="{FF2B5EF4-FFF2-40B4-BE49-F238E27FC236}">
+                <a16:creationId xmlns:a16="http://schemas.microsoft.com/office/drawing/2014/main" id="{868B3D23-1C44-A448-BB03-E2BC0BD36F57}"/>
+              </a:ext>
+            </a:extLst>
+          </p:cNvPr>
+          <p:cNvSpPr>
+            <a:spLocks noGrp="1"/>
+          </p:cNvSpPr>
+          <p:nvPr>
+            <p:ph type="title"/>
+          </p:nvPr>
+        </p:nvSpPr>
+        <p:spPr/>
+        <p:txBody>
+          <a:bodyPr/>
+          <a:lstStyle/>
+          <a:p>
+            <a:r>
+              <a:rPr lang="ru-RU" dirty="0"/>
+              <a:t>Конец игры</a:t>
+            </a:r>
+          </a:p>
+        </p:txBody>
+      </p:sp>
+      <p:pic>
+        <p:nvPicPr>
+          <p:cNvPr id="6" name="Объект 5">
+            <a:extLst>
+              <a:ext uri="{FF2B5EF4-FFF2-40B4-BE49-F238E27FC236}">
+                <a16:creationId xmlns:a16="http://schemas.microsoft.com/office/drawing/2014/main" id="{C5F2CB96-7C44-7C44-B919-EDFA604527B8}"/>
+              </a:ext>
+            </a:extLst>
+          </p:cNvPr>
+          <p:cNvPicPr>
+            <a:picLocks noGrp="1" noChangeAspect="1"/>
+          </p:cNvPicPr>
+          <p:nvPr>
+            <p:ph idx="1"/>
+          </p:nvPr>
+        </p:nvPicPr>
+        <p:blipFill>
+          <a:blip r:embed="rId2"/>
+          <a:srcRect/>
+          <a:stretch/>
+        </p:blipFill>
+        <p:spPr>
+          <a:xfrm>
+            <a:off x="5472067" y="803275"/>
+            <a:ext cx="5551579" cy="5249863"/>
+          </a:xfrm>
+        </p:spPr>
+      </p:pic>
+      <p:sp>
+        <p:nvSpPr>
+          <p:cNvPr id="4" name="Текст 3">
+            <a:extLst>
+              <a:ext uri="{FF2B5EF4-FFF2-40B4-BE49-F238E27FC236}">
+                <a16:creationId xmlns:a16="http://schemas.microsoft.com/office/drawing/2014/main" id="{3C6A936D-F734-0B49-94BF-65F91E479633}"/>
+              </a:ext>
+            </a:extLst>
+          </p:cNvPr>
+          <p:cNvSpPr>
+            <a:spLocks noGrp="1"/>
+          </p:cNvSpPr>
+          <p:nvPr>
+            <p:ph type="body" sz="half" idx="2"/>
+          </p:nvPr>
+        </p:nvSpPr>
+        <p:spPr/>
+        <p:txBody>
+          <a:bodyPr/>
+          <a:lstStyle/>
+          <a:p>
+            <a:r>
+              <a:rPr lang="ru-RU" dirty="0"/>
+              <a:t>Запись результата</a:t>
+            </a:r>
+          </a:p>
+        </p:txBody>
+      </p:sp>
+    </p:spTree>
+    <p:extLst>
+      <p:ext uri="{BB962C8B-B14F-4D97-AF65-F5344CB8AC3E}">
+        <p14:creationId xmlns:p14="http://schemas.microsoft.com/office/powerpoint/2010/main" val="2211818737"/>
+      </p:ext>
+    </p:extLst>
+  </p:cSld>
+  <p:clrMapOvr>
+    <a:masterClrMapping/>
+  </p:clrMapOvr>
+</p:sld>
+</file>
+
+<file path=ppt/slides/slide17.xml><?xml version="1.0" encoding="utf-8"?>
+<p:sld xmlns:a="http://schemas.openxmlformats.org/drawingml/2006/main" xmlns:r="http://schemas.openxmlformats.org/officeDocument/2006/relationships" xmlns:p="http://schemas.openxmlformats.org/presentationml/2006/main">
+  <p:cSld>
+    <p:spTree>
+      <p:nvGrpSpPr>
+        <p:cNvPr id="1" name=""/>
+        <p:cNvGrpSpPr/>
+        <p:nvPr/>
+      </p:nvGrpSpPr>
+      <p:grpSpPr>
+        <a:xfrm>
+          <a:off x="0" y="0"/>
+          <a:ext cx="0" cy="0"/>
+          <a:chOff x="0" y="0"/>
+          <a:chExt cx="0" cy="0"/>
+        </a:xfrm>
+      </p:grpSpPr>
+      <p:sp>
+        <p:nvSpPr>
+          <p:cNvPr id="2" name="Заголовок 1">
+            <a:extLst>
+              <a:ext uri="{FF2B5EF4-FFF2-40B4-BE49-F238E27FC236}">
+                <a16:creationId xmlns:a16="http://schemas.microsoft.com/office/drawing/2014/main" id="{868B3D23-1C44-A448-BB03-E2BC0BD36F57}"/>
+              </a:ext>
+            </a:extLst>
+          </p:cNvPr>
+          <p:cNvSpPr>
+            <a:spLocks noGrp="1"/>
+          </p:cNvSpPr>
+          <p:nvPr>
+            <p:ph type="title"/>
+          </p:nvPr>
+        </p:nvSpPr>
+        <p:spPr/>
+        <p:txBody>
+          <a:bodyPr/>
+          <a:lstStyle/>
+          <a:p>
+            <a:r>
+              <a:rPr lang="ru-RU" dirty="0"/>
+              <a:t>Конец игры</a:t>
+            </a:r>
+          </a:p>
+        </p:txBody>
+      </p:sp>
+      <p:pic>
+        <p:nvPicPr>
+          <p:cNvPr id="6" name="Объект 5">
+            <a:extLst>
+              <a:ext uri="{FF2B5EF4-FFF2-40B4-BE49-F238E27FC236}">
+                <a16:creationId xmlns:a16="http://schemas.microsoft.com/office/drawing/2014/main" id="{C5F2CB96-7C44-7C44-B919-EDFA604527B8}"/>
+              </a:ext>
+            </a:extLst>
+          </p:cNvPr>
+          <p:cNvPicPr>
+            <a:picLocks noGrp="1" noChangeAspect="1"/>
+          </p:cNvPicPr>
+          <p:nvPr>
+            <p:ph idx="1"/>
+          </p:nvPr>
+        </p:nvPicPr>
+        <p:blipFill>
+          <a:blip r:embed="rId2"/>
+          <a:srcRect/>
+          <a:stretch/>
+        </p:blipFill>
+        <p:spPr>
+          <a:xfrm>
+            <a:off x="5476816" y="803275"/>
+            <a:ext cx="5542081" cy="5249863"/>
+          </a:xfrm>
+        </p:spPr>
+      </p:pic>
+      <p:sp>
+        <p:nvSpPr>
+          <p:cNvPr id="4" name="Текст 3">
+            <a:extLst>
+              <a:ext uri="{FF2B5EF4-FFF2-40B4-BE49-F238E27FC236}">
+                <a16:creationId xmlns:a16="http://schemas.microsoft.com/office/drawing/2014/main" id="{3C6A936D-F734-0B49-94BF-65F91E479633}"/>
+              </a:ext>
+            </a:extLst>
+          </p:cNvPr>
+          <p:cNvSpPr>
+            <a:spLocks noGrp="1"/>
+          </p:cNvSpPr>
+          <p:nvPr>
+            <p:ph type="body" sz="half" idx="2"/>
+          </p:nvPr>
+        </p:nvSpPr>
+        <p:spPr/>
+        <p:txBody>
+          <a:bodyPr/>
+          <a:lstStyle/>
+          <a:p>
+            <a:r>
+              <a:rPr lang="ru-RU" dirty="0"/>
+              <a:t>Выбор действия</a:t>
+            </a:r>
+          </a:p>
+        </p:txBody>
+      </p:sp>
+    </p:spTree>
+    <p:extLst>
+      <p:ext uri="{BB962C8B-B14F-4D97-AF65-F5344CB8AC3E}">
+        <p14:creationId xmlns:p14="http://schemas.microsoft.com/office/powerpoint/2010/main" val="735688560"/>
       </p:ext>
     </p:extLst>
   </p:cSld>
@@ -16835,7 +17654,7 @@
           <p:cNvPr id="2" name="Заголовок 1">
             <a:extLst>
               <a:ext uri="{FF2B5EF4-FFF2-40B4-BE49-F238E27FC236}">
-                <a16:creationId xmlns:a16="http://schemas.microsoft.com/office/drawing/2014/main" id="{03B6056E-DCCA-4247-9274-474F85E55243}"/>
+                <a16:creationId xmlns:a16="http://schemas.microsoft.com/office/drawing/2014/main" id="{D3E106DE-6637-D149-9A57-556712591AC0}"/>
               </a:ext>
             </a:extLst>
           </p:cNvPr>
@@ -16853,46 +17672,17 @@
           <a:p>
             <a:r>
               <a:rPr lang="ru-RU" dirty="0"/>
-              <a:t>Нулевой уровень</a:t>
+              <a:t>База данных</a:t>
             </a:r>
           </a:p>
         </p:txBody>
       </p:sp>
-      <p:pic>
-        <p:nvPicPr>
-          <p:cNvPr id="6" name="Объект 5">
-            <a:extLst>
-              <a:ext uri="{FF2B5EF4-FFF2-40B4-BE49-F238E27FC236}">
-                <a16:creationId xmlns:a16="http://schemas.microsoft.com/office/drawing/2014/main" id="{224E80C8-BC3A-FC48-AE2F-29F6D878D807}"/>
-              </a:ext>
-            </a:extLst>
-          </p:cNvPr>
-          <p:cNvPicPr>
-            <a:picLocks noGrp="1" noChangeAspect="1"/>
-          </p:cNvPicPr>
-          <p:nvPr>
-            <p:ph idx="1"/>
-          </p:nvPr>
-        </p:nvPicPr>
-        <p:blipFill>
-          <a:blip r:embed="rId2"/>
-          <a:stretch>
-            <a:fillRect/>
-          </a:stretch>
-        </p:blipFill>
-        <p:spPr>
-          <a:xfrm>
-            <a:off x="5476816" y="803275"/>
-            <a:ext cx="5542081" cy="5249863"/>
-          </a:xfrm>
-        </p:spPr>
-      </p:pic>
       <p:sp>
         <p:nvSpPr>
-          <p:cNvPr id="4" name="Текст 3">
+          <p:cNvPr id="3" name="Объект 2">
             <a:extLst>
               <a:ext uri="{FF2B5EF4-FFF2-40B4-BE49-F238E27FC236}">
-                <a16:creationId xmlns:a16="http://schemas.microsoft.com/office/drawing/2014/main" id="{47F4570A-8A82-8744-8A68-C4DF26222256}"/>
+                <a16:creationId xmlns:a16="http://schemas.microsoft.com/office/drawing/2014/main" id="{0501DC2A-F4CA-C649-8C07-AC6F398C0D3E}"/>
               </a:ext>
             </a:extLst>
           </p:cNvPr>
@@ -16900,17 +17690,74 @@
             <a:spLocks noGrp="1"/>
           </p:cNvSpPr>
           <p:nvPr>
-            <p:ph type="body" sz="half" idx="2"/>
+            <p:ph idx="1"/>
           </p:nvPr>
         </p:nvSpPr>
         <p:spPr/>
         <p:txBody>
-          <a:bodyPr/>
+          <a:bodyPr>
+            <a:normAutofit/>
+          </a:bodyPr>
           <a:lstStyle/>
           <a:p>
+            <a:pPr marL="0" lvl="0" indent="0">
+              <a:buNone/>
+            </a:pPr>
             <a:r>
-              <a:rPr lang="ru-RU" dirty="0"/>
-              <a:t>Цвет коробочек – серый, у игрока максимум жизней, скорость падения - минимальна</a:t>
+              <a:rPr lang="ru-RU" sz="2400" dirty="0"/>
+              <a:t>Для простоты развертывания приложения устроена на </a:t>
+            </a:r>
+            <a:r>
+              <a:rPr lang="en-US" sz="2400" dirty="0"/>
+              <a:t>SQLite</a:t>
+            </a:r>
+            <a:r>
+              <a:rPr lang="ru-RU" sz="2400" dirty="0"/>
+              <a:t>. База содержит основную таблицу </a:t>
+            </a:r>
+            <a:r>
+              <a:rPr lang="en-US" sz="2400" i="1" dirty="0"/>
+              <a:t>records </a:t>
+            </a:r>
+            <a:r>
+              <a:rPr lang="ru-RU" sz="2400" dirty="0"/>
+              <a:t>и вспомогательную </a:t>
+            </a:r>
+            <a:r>
+              <a:rPr lang="en-US" sz="2400" i="1" dirty="0"/>
+              <a:t>difficult</a:t>
+            </a:r>
+            <a:r>
+              <a:rPr lang="ru-RU" sz="2400" i="1" dirty="0"/>
+              <a:t>.</a:t>
+            </a:r>
+            <a:r>
+              <a:rPr lang="ru-RU" sz="2400" dirty="0"/>
+              <a:t> При помощи вспомогательной таблицы происходит конфигурация игрового процесса в зависимости от выбранного уровня сложности, а также через </a:t>
+            </a:r>
+            <a:r>
+              <a:rPr lang="en-US" sz="2400" u="sng" dirty="0"/>
+              <a:t>foreign key</a:t>
+            </a:r>
+            <a:r>
+              <a:rPr lang="en-US" sz="2400" dirty="0"/>
+              <a:t> </a:t>
+            </a:r>
+            <a:r>
+              <a:rPr lang="ru-RU" sz="2400" dirty="0"/>
+              <a:t>собирается полная информация об успехе игрока в таблице </a:t>
+            </a:r>
+            <a:r>
+              <a:rPr lang="en-US" sz="2400" i="1" dirty="0"/>
+              <a:t>records</a:t>
+            </a:r>
+            <a:r>
+              <a:rPr lang="ru-RU" sz="2400" i="1" dirty="0"/>
+              <a:t>.</a:t>
+            </a:r>
+            <a:r>
+              <a:rPr lang="ru-RU" sz="2800" dirty="0"/>
+              <a:t> </a:t>
             </a:r>
           </a:p>
         </p:txBody>
@@ -16918,7 +17765,7 @@
     </p:spTree>
     <p:extLst>
       <p:ext uri="{BB962C8B-B14F-4D97-AF65-F5344CB8AC3E}">
-        <p14:creationId xmlns:p14="http://schemas.microsoft.com/office/powerpoint/2010/main" val="3884946651"/>
+        <p14:creationId xmlns:p14="http://schemas.microsoft.com/office/powerpoint/2010/main" val="1942144816"/>
       </p:ext>
     </p:extLst>
   </p:cSld>
@@ -16950,7 +17797,7 @@
           <p:cNvPr id="2" name="Заголовок 1">
             <a:extLst>
               <a:ext uri="{FF2B5EF4-FFF2-40B4-BE49-F238E27FC236}">
-                <a16:creationId xmlns:a16="http://schemas.microsoft.com/office/drawing/2014/main" id="{421A76EF-F1F0-214D-A6DF-C00448B82CE1}"/>
+                <a16:creationId xmlns:a16="http://schemas.microsoft.com/office/drawing/2014/main" id="{D3E106DE-6637-D149-9A57-556712591AC0}"/>
               </a:ext>
             </a:extLst>
           </p:cNvPr>
@@ -16968,26 +17815,54 @@
           <a:p>
             <a:r>
               <a:rPr lang="ru-RU" dirty="0"/>
-              <a:t>Первый уровень</a:t>
+              <a:t>Схема данных</a:t>
             </a:r>
+          </a:p>
+        </p:txBody>
+      </p:sp>
+      <p:sp>
+        <p:nvSpPr>
+          <p:cNvPr id="3" name="Объект 2">
+            <a:extLst>
+              <a:ext uri="{FF2B5EF4-FFF2-40B4-BE49-F238E27FC236}">
+                <a16:creationId xmlns:a16="http://schemas.microsoft.com/office/drawing/2014/main" id="{0501DC2A-F4CA-C649-8C07-AC6F398C0D3E}"/>
+              </a:ext>
+            </a:extLst>
+          </p:cNvPr>
+          <p:cNvSpPr>
+            <a:spLocks noGrp="1"/>
+          </p:cNvSpPr>
+          <p:nvPr>
+            <p:ph idx="1"/>
+          </p:nvPr>
+        </p:nvSpPr>
+        <p:spPr/>
+        <p:txBody>
+          <a:bodyPr>
+            <a:normAutofit/>
+          </a:bodyPr>
+          <a:lstStyle/>
+          <a:p>
+            <a:pPr marL="0" lvl="0" indent="0">
+              <a:buNone/>
+            </a:pPr>
+            <a:endParaRPr lang="ru-RU" sz="2800" dirty="0"/>
           </a:p>
         </p:txBody>
       </p:sp>
       <p:pic>
         <p:nvPicPr>
-          <p:cNvPr id="6" name="Объект 5">
+          <p:cNvPr id="5" name="Рисунок 4">
             <a:extLst>
               <a:ext uri="{FF2B5EF4-FFF2-40B4-BE49-F238E27FC236}">
-                <a16:creationId xmlns:a16="http://schemas.microsoft.com/office/drawing/2014/main" id="{1AE9ECA7-0E7C-CF41-A509-763D301775BD}"/>
+                <a16:creationId xmlns:a16="http://schemas.microsoft.com/office/drawing/2014/main" id="{DD4A0941-37EA-9D48-A3AE-6FB1CC1F2F0E}"/>
               </a:ext>
             </a:extLst>
           </p:cNvPr>
           <p:cNvPicPr>
-            <a:picLocks noGrp="1" noChangeAspect="1"/>
+            <a:picLocks noChangeAspect="1"/>
           </p:cNvPicPr>
-          <p:nvPr>
-            <p:ph idx="1"/>
-          </p:nvPr>
+          <p:nvPr/>
         </p:nvPicPr>
         <p:blipFill>
           <a:blip r:embed="rId2"/>
@@ -16997,43 +17872,78 @@
         </p:blipFill>
         <p:spPr>
           <a:xfrm>
-            <a:off x="5455051" y="803275"/>
-            <a:ext cx="5585610" cy="5249863"/>
+            <a:off x="7122390" y="910701"/>
+            <a:ext cx="2060864" cy="1228192"/>
           </a:xfrm>
+          <a:prstGeom prst="rect">
+            <a:avLst/>
+          </a:prstGeom>
         </p:spPr>
       </p:pic>
-      <p:sp>
-        <p:nvSpPr>
-          <p:cNvPr id="4" name="Текст 3">
+      <p:pic>
+        <p:nvPicPr>
+          <p:cNvPr id="7" name="Рисунок 6">
             <a:extLst>
               <a:ext uri="{FF2B5EF4-FFF2-40B4-BE49-F238E27FC236}">
-                <a16:creationId xmlns:a16="http://schemas.microsoft.com/office/drawing/2014/main" id="{9AC3A3C3-CB7E-1D48-9291-FB76FDE5A3B6}"/>
+                <a16:creationId xmlns:a16="http://schemas.microsoft.com/office/drawing/2014/main" id="{C16A74DF-27A5-1F40-B5C9-8CD62587CD18}"/>
               </a:ext>
             </a:extLst>
           </p:cNvPr>
-          <p:cNvSpPr>
-            <a:spLocks noGrp="1"/>
-          </p:cNvSpPr>
-          <p:nvPr>
-            <p:ph type="body" sz="half" idx="2"/>
-          </p:nvPr>
-        </p:nvSpPr>
-        <p:spPr/>
-        <p:txBody>
-          <a:bodyPr/>
-          <a:lstStyle/>
-          <a:p>
-            <a:r>
-              <a:rPr lang="ru-RU" dirty="0"/>
-              <a:t>Цвет коробочек сменился, в том числе у падающих.</a:t>
-            </a:r>
-          </a:p>
-        </p:txBody>
-      </p:sp>
+          <p:cNvPicPr>
+            <a:picLocks noChangeAspect="1"/>
+          </p:cNvPicPr>
+          <p:nvPr/>
+        </p:nvPicPr>
+        <p:blipFill>
+          <a:blip r:embed="rId3"/>
+          <a:stretch>
+            <a:fillRect/>
+          </a:stretch>
+        </p:blipFill>
+        <p:spPr>
+          <a:xfrm>
+            <a:off x="5159332" y="2018833"/>
+            <a:ext cx="6232890" cy="2417379"/>
+          </a:xfrm>
+          <a:prstGeom prst="rect">
+            <a:avLst/>
+          </a:prstGeom>
+        </p:spPr>
+      </p:pic>
+      <p:pic>
+        <p:nvPicPr>
+          <p:cNvPr id="9" name="Рисунок 8">
+            <a:extLst>
+              <a:ext uri="{FF2B5EF4-FFF2-40B4-BE49-F238E27FC236}">
+                <a16:creationId xmlns:a16="http://schemas.microsoft.com/office/drawing/2014/main" id="{0A31D1BE-9CD2-404B-B913-3A928BB267ED}"/>
+              </a:ext>
+            </a:extLst>
+          </p:cNvPr>
+          <p:cNvPicPr>
+            <a:picLocks noChangeAspect="1"/>
+          </p:cNvPicPr>
+          <p:nvPr/>
+        </p:nvPicPr>
+        <p:blipFill>
+          <a:blip r:embed="rId4"/>
+          <a:stretch>
+            <a:fillRect/>
+          </a:stretch>
+        </p:blipFill>
+        <p:spPr>
+          <a:xfrm>
+            <a:off x="5147461" y="4436213"/>
+            <a:ext cx="6232890" cy="1615596"/>
+          </a:xfrm>
+          <a:prstGeom prst="rect">
+            <a:avLst/>
+          </a:prstGeom>
+        </p:spPr>
+      </p:pic>
     </p:spTree>
     <p:extLst>
       <p:ext uri="{BB962C8B-B14F-4D97-AF65-F5344CB8AC3E}">
-        <p14:creationId xmlns:p14="http://schemas.microsoft.com/office/powerpoint/2010/main" val="3444588590"/>
+        <p14:creationId xmlns:p14="http://schemas.microsoft.com/office/powerpoint/2010/main" val="483733181"/>
       </p:ext>
     </p:extLst>
   </p:cSld>

</xml_diff>